<commit_message>
changes done in posterDraftLakmarapu.pptx
</commit_message>
<xml_diff>
--- a/posterDraftLakmarapu.pptx
+++ b/posterDraftLakmarapu.pptx
@@ -1395,7 +1395,7 @@
           <a:p>
             <a:fld id="{E695B7AD-C0E4-4106-98F1-A426950388A1}" type="datetimeFigureOut">
               <a:rPr lang="en-US" smtClean="0"/>
-              <a:t>7/1/2019</a:t>
+              <a:t>7/2/2019</a:t>
             </a:fld>
             <a:endParaRPr lang="en-US"/>
           </a:p>
@@ -1875,7 +1875,7 @@
         </p:spPr>
         <p:txBody>
           <a:bodyPr tIns="365760">
-            <a:normAutofit lnSpcReduction="10000"/>
+            <a:normAutofit/>
           </a:bodyPr>
           <a:lstStyle/>
           <a:p>
@@ -1900,12 +1900,12 @@
               <a:t>tweeting about the </a:t>
             </a:r>
             <a:r>
-              <a:rPr lang="en-US" sz="7200" dirty="0" smtClean="0"/>
+              <a:rPr lang="en-US" sz="7200" smtClean="0"/>
               <a:t>android </a:t>
             </a:r>
             <a:r>
-              <a:rPr lang="en-US" sz="7200" dirty="0"/>
-              <a:t>event/tweet</a:t>
+              <a:rPr lang="en-US" sz="7200" smtClean="0"/>
+              <a:t>tweet</a:t>
             </a:r>
             <a:r>
               <a:rPr lang="en-US" sz="7200" dirty="0" smtClean="0"/>
@@ -1983,15 +1983,7 @@
           <a:p>
             <a:r>
               <a:rPr lang="en-US" dirty="0" smtClean="0"/>
-              <a:t>IPhone Users reaction towards </a:t>
-            </a:r>
-            <a:r>
-              <a:rPr lang="en-US" dirty="0" smtClean="0"/>
-              <a:t>Android </a:t>
-            </a:r>
-            <a:r>
-              <a:rPr lang="en-US" dirty="0" smtClean="0"/>
-              <a:t>Tweets</a:t>
+              <a:t>IPhone Users reaction towards Android Tweets</a:t>
             </a:r>
             <a:endParaRPr lang="en-US" dirty="0"/>
           </a:p>

</xml_diff>

<commit_message>
Changes done in android.ipynb
</commit_message>
<xml_diff>
--- a/posterDraftLakmarapu.pptx
+++ b/posterDraftLakmarapu.pptx
@@ -1901,11 +1901,7 @@
             </a:r>
             <a:r>
               <a:rPr lang="en-US" sz="7200" smtClean="0"/>
-              <a:t>android </a:t>
-            </a:r>
-            <a:r>
-              <a:rPr lang="en-US" sz="7200" smtClean="0"/>
-              <a:t>tweet</a:t>
+              <a:t>android tweet</a:t>
             </a:r>
             <a:r>
               <a:rPr lang="en-US" sz="7200" dirty="0" smtClean="0"/>
@@ -2248,7 +2244,7 @@
               <a:rPr lang="en-US" sz="6000" dirty="0">
                 <a:hlinkClick r:id="rId4"/>
               </a:rPr>
-              <a:t>https://github.com/NikithaLakmarapu/posterDraftLakmarapu</a:t>
+              <a:t>https://github.com/44520-s19/wm-final-project-NikithaLakmarapu</a:t>
             </a:r>
             <a:endParaRPr lang="en-US" sz="6000" dirty="0"/>
           </a:p>
@@ -2584,7 +2580,7 @@
         </p:blipFill>
         <p:spPr>
           <a:xfrm>
-            <a:off x="30595906" y="29502410"/>
+            <a:off x="30595906" y="28961405"/>
             <a:ext cx="4644988" cy="1904446"/>
           </a:xfrm>
           <a:prstGeom prst="rect">

</xml_diff>